<commit_message>
slides fp e cocomo
</commit_message>
<xml_diff>
--- a/Slides.pptx
+++ b/Slides.pptx
@@ -12,6 +12,8 @@
     <p:sldId id="260" r:id="rId6"/>
     <p:sldId id="262" r:id="rId7"/>
     <p:sldId id="261" r:id="rId8"/>
+    <p:sldId id="263" r:id="rId9"/>
+    <p:sldId id="264" r:id="rId10"/>
   </p:sldIdLst>
   <p:sldSz cx="12192000" cy="6858000"/>
   <p:notesSz cx="6858000" cy="9144000"/>
@@ -110,6 +112,11 @@
       </a:defRPr>
     </a:lvl9pPr>
   </p:defaultTextStyle>
+  <p:extLst>
+    <p:ext uri="{EFAFB233-063F-42B5-8137-9DF3F51BA10A}">
+      <p15:sldGuideLst xmlns:p15="http://schemas.microsoft.com/office/powerpoint/2012/main"/>
+    </p:ext>
+  </p:extLst>
 </p:presentation>
 </file>
 
@@ -281,7 +288,7 @@
           <a:p>
             <a:fld id="{9E016143-E03C-4CFD-AFDC-14E5BDEA754C}" type="datetimeFigureOut">
               <a:rPr lang="en-US" dirty="0"/>
-              <a:t>11/11/2015</a:t>
+              <a:t>2/27/2016</a:t>
             </a:fld>
             <a:endParaRPr lang="en-US" dirty="0"/>
           </a:p>
@@ -505,7 +512,7 @@
           <a:p>
             <a:fld id="{C033E54A-A8CA-48C1-9504-691B58049D29}" type="datetimeFigureOut">
               <a:rPr lang="en-US" dirty="0"/>
-              <a:t>11/11/2015</a:t>
+              <a:t>2/27/2016</a:t>
             </a:fld>
             <a:endParaRPr lang="en-US" dirty="0"/>
           </a:p>
@@ -680,7 +687,7 @@
           <a:p>
             <a:fld id="{B5F6C806-BBF7-471C-9527-881CE2266695}" type="datetimeFigureOut">
               <a:rPr lang="en-US" dirty="0"/>
-              <a:t>11/11/2015</a:t>
+              <a:t>2/27/2016</a:t>
             </a:fld>
             <a:endParaRPr lang="en-US" dirty="0"/>
           </a:p>
@@ -845,7 +852,7 @@
           <a:p>
             <a:fld id="{78C94063-DF36-4330-A365-08DA1FA5B7D6}" type="datetimeFigureOut">
               <a:rPr lang="en-US" dirty="0"/>
-              <a:t>11/11/2015</a:t>
+              <a:t>2/27/2016</a:t>
             </a:fld>
             <a:endParaRPr lang="en-US" dirty="0"/>
           </a:p>
@@ -1094,7 +1101,7 @@
           <a:p>
             <a:fld id="{908A7C6C-0F39-4D70-8E8D-FE5B9C95FA73}" type="datetimeFigureOut">
               <a:rPr lang="en-US" dirty="0"/>
-              <a:t>11/11/2015</a:t>
+              <a:t>2/27/2016</a:t>
             </a:fld>
             <a:endParaRPr lang="en-US" dirty="0"/>
           </a:p>
@@ -1415,7 +1422,7 @@
           <a:p>
             <a:fld id="{DFCFA4AC-08CC-42CE-BD01-C191750A04EC}" type="datetimeFigureOut">
               <a:rPr lang="en-US" dirty="0"/>
-              <a:t>11/11/2015</a:t>
+              <a:t>2/27/2016</a:t>
             </a:fld>
             <a:endParaRPr lang="en-US" dirty="0"/>
           </a:p>
@@ -1861,7 +1868,7 @@
           <a:p>
             <a:fld id="{1BA7A723-92A7-435B-B681-F25B092FEFEB}" type="datetimeFigureOut">
               <a:rPr lang="en-US" dirty="0"/>
-              <a:t>11/11/2015</a:t>
+              <a:t>2/27/2016</a:t>
             </a:fld>
             <a:endParaRPr lang="en-US" dirty="0"/>
           </a:p>
@@ -1974,7 +1981,7 @@
           <a:p>
             <a:fld id="{4F170639-886C-4FCF-9EAB-ABB5DA3F3F4A}" type="datetimeFigureOut">
               <a:rPr lang="en-US" dirty="0"/>
-              <a:t>11/11/2015</a:t>
+              <a:t>2/27/2016</a:t>
             </a:fld>
             <a:endParaRPr lang="en-US" dirty="0"/>
           </a:p>
@@ -2064,7 +2071,7 @@
           <a:p>
             <a:fld id="{22230651-31F4-45D2-98AE-A2108F41BC07}" type="datetimeFigureOut">
               <a:rPr lang="en-US" dirty="0"/>
-              <a:t>11/11/2015</a:t>
+              <a:t>2/27/2016</a:t>
             </a:fld>
             <a:endParaRPr lang="en-US" dirty="0"/>
           </a:p>
@@ -2346,7 +2353,7 @@
           <a:p>
             <a:fld id="{6F53789A-C914-4DB1-8815-80B5EC7335C5}" type="datetimeFigureOut">
               <a:rPr lang="en-US" dirty="0"/>
-              <a:t>11/11/2015</a:t>
+              <a:t>2/27/2016</a:t>
             </a:fld>
             <a:endParaRPr lang="en-US" dirty="0"/>
           </a:p>
@@ -2666,7 +2673,7 @@
           <a:p>
             <a:fld id="{5E6440AA-91A0-436F-8FDB-C0F939DCAE21}" type="datetimeFigureOut">
               <a:rPr lang="en-US" dirty="0"/>
-              <a:t>11/11/2015</a:t>
+              <a:t>2/27/2016</a:t>
             </a:fld>
             <a:endParaRPr lang="en-US" dirty="0"/>
           </a:p>
@@ -2915,7 +2922,7 @@
           <a:p>
             <a:fld id="{0E59FD0C-5451-4CA0-86AF-E70AE3279989}" type="datetimeFigureOut">
               <a:rPr lang="en-US" dirty="0"/>
-              <a:t>11/11/2015</a:t>
+              <a:t>2/27/2016</a:t>
             </a:fld>
             <a:endParaRPr lang="en-US" dirty="0"/>
           </a:p>
@@ -4481,6 +4488,30 @@
           <a:bodyPr/>
           <a:lstStyle/>
           <a:p>
+            <a:r>
+              <a:rPr lang="it-IT" dirty="0" smtClean="0"/>
+              <a:t>Project </a:t>
+            </a:r>
+            <a:r>
+              <a:rPr lang="it-IT" dirty="0" err="1" smtClean="0"/>
+              <a:t>size</a:t>
+            </a:r>
+            <a:r>
+              <a:rPr lang="it-IT" dirty="0" smtClean="0"/>
+              <a:t> and </a:t>
+            </a:r>
+            <a:r>
+              <a:rPr lang="it-IT" dirty="0" err="1" smtClean="0"/>
+              <a:t>cost</a:t>
+            </a:r>
+            <a:r>
+              <a:rPr lang="it-IT" dirty="0" smtClean="0"/>
+              <a:t> </a:t>
+            </a:r>
+            <a:r>
+              <a:rPr lang="it-IT" dirty="0" err="1" smtClean="0"/>
+              <a:t>evaluation</a:t>
+            </a:r>
             <a:endParaRPr lang="it-IT" dirty="0"/>
           </a:p>
         </p:txBody>
@@ -4495,12 +4526,109 @@
             <p:ph idx="1"/>
           </p:nvPr>
         </p:nvSpPr>
-        <p:spPr/>
-        <p:txBody>
-          <a:bodyPr/>
-          <a:lstStyle/>
-          <a:p>
-            <a:endParaRPr lang="it-IT"/>
+        <p:spPr>
+          <a:xfrm>
+            <a:off x="1261872" y="2907323"/>
+            <a:ext cx="8595360" cy="3272814"/>
+          </a:xfrm>
+        </p:spPr>
+        <p:txBody>
+          <a:bodyPr/>
+          <a:lstStyle/>
+          <a:p>
+            <a:r>
+              <a:rPr lang="it-IT" sz="2000" dirty="0" smtClean="0"/>
+              <a:t>Evaluation of </a:t>
+            </a:r>
+            <a:r>
+              <a:rPr lang="it-IT" sz="2000" dirty="0" err="1" smtClean="0"/>
+              <a:t>project</a:t>
+            </a:r>
+            <a:r>
+              <a:rPr lang="it-IT" sz="2000" dirty="0" smtClean="0"/>
+              <a:t> </a:t>
+            </a:r>
+            <a:r>
+              <a:rPr lang="it-IT" sz="2000" dirty="0" err="1" smtClean="0"/>
+              <a:t>size</a:t>
+            </a:r>
+            <a:r>
+              <a:rPr lang="it-IT" sz="2000" dirty="0" smtClean="0"/>
+              <a:t> </a:t>
+            </a:r>
+            <a:r>
+              <a:rPr lang="it-IT" sz="2000" dirty="0" err="1" smtClean="0"/>
+              <a:t>using</a:t>
+            </a:r>
+            <a:r>
+              <a:rPr lang="it-IT" sz="2000" dirty="0" smtClean="0"/>
+              <a:t> </a:t>
+            </a:r>
+            <a:r>
+              <a:rPr lang="it-IT" sz="2000" dirty="0" err="1" smtClean="0"/>
+              <a:t>Function</a:t>
+            </a:r>
+            <a:r>
+              <a:rPr lang="it-IT" sz="2000" dirty="0" smtClean="0"/>
+              <a:t> </a:t>
+            </a:r>
+            <a:r>
+              <a:rPr lang="it-IT" sz="2000" dirty="0" err="1" smtClean="0"/>
+              <a:t>Points</a:t>
+            </a:r>
+            <a:r>
+              <a:rPr lang="it-IT" sz="2000" dirty="0" smtClean="0"/>
+              <a:t> </a:t>
+            </a:r>
+            <a:r>
+              <a:rPr lang="it-IT" sz="2000" dirty="0" err="1" smtClean="0"/>
+              <a:t>method</a:t>
+            </a:r>
+            <a:endParaRPr lang="it-IT" sz="2000" dirty="0" smtClean="0"/>
+          </a:p>
+          <a:p>
+            <a:endParaRPr lang="it-IT" sz="2000" dirty="0"/>
+          </a:p>
+          <a:p>
+            <a:endParaRPr lang="it-IT" sz="2000" dirty="0" smtClean="0"/>
+          </a:p>
+          <a:p>
+            <a:r>
+              <a:rPr lang="it-IT" sz="2000" dirty="0" smtClean="0"/>
+              <a:t>COCOMO II </a:t>
+            </a:r>
+            <a:r>
+              <a:rPr lang="it-IT" sz="2000" dirty="0" err="1" smtClean="0"/>
+              <a:t>analysis</a:t>
+            </a:r>
+            <a:r>
+              <a:rPr lang="it-IT" sz="2000" dirty="0" smtClean="0"/>
+              <a:t>  to </a:t>
+            </a:r>
+            <a:r>
+              <a:rPr lang="it-IT" sz="2000" dirty="0" err="1" smtClean="0"/>
+              <a:t>calculate</a:t>
+            </a:r>
+            <a:r>
+              <a:rPr lang="it-IT" sz="2000" dirty="0" smtClean="0"/>
+              <a:t> </a:t>
+            </a:r>
+            <a:r>
+              <a:rPr lang="it-IT" sz="2000" dirty="0" err="1" smtClean="0"/>
+              <a:t>Effort</a:t>
+            </a:r>
+            <a:r>
+              <a:rPr lang="it-IT" sz="2000" dirty="0" smtClean="0"/>
+              <a:t> and </a:t>
+            </a:r>
+            <a:r>
+              <a:rPr lang="it-IT" sz="2000" dirty="0" err="1" smtClean="0"/>
+              <a:t>Duration</a:t>
+            </a:r>
+            <a:endParaRPr lang="it-IT" sz="2000" dirty="0" smtClean="0"/>
+          </a:p>
+          <a:p>
+            <a:endParaRPr lang="it-IT" dirty="0"/>
           </a:p>
         </p:txBody>
       </p:sp>
@@ -4508,6 +4636,481 @@
     <p:extLst>
       <p:ext uri="{BB962C8B-B14F-4D97-AF65-F5344CB8AC3E}">
         <p14:creationId xmlns:p14="http://schemas.microsoft.com/office/powerpoint/2010/main" val="3710442795"/>
+      </p:ext>
+    </p:extLst>
+  </p:cSld>
+  <p:clrMapOvr>
+    <a:masterClrMapping/>
+  </p:clrMapOvr>
+  <p:timing>
+    <p:tnLst>
+      <p:par>
+        <p:cTn id="1" dur="indefinite" restart="never" nodeType="tmRoot"/>
+      </p:par>
+    </p:tnLst>
+  </p:timing>
+</p:sld>
+</file>
+
+<file path=ppt/slides/slide8.xml><?xml version="1.0" encoding="utf-8"?>
+<p:sld xmlns:a="http://schemas.openxmlformats.org/drawingml/2006/main" xmlns:r="http://schemas.openxmlformats.org/officeDocument/2006/relationships" xmlns:p="http://schemas.openxmlformats.org/presentationml/2006/main">
+  <p:cSld>
+    <p:spTree>
+      <p:nvGrpSpPr>
+        <p:cNvPr id="1" name=""/>
+        <p:cNvGrpSpPr/>
+        <p:nvPr/>
+      </p:nvGrpSpPr>
+      <p:grpSpPr>
+        <a:xfrm>
+          <a:off x="0" y="0"/>
+          <a:ext cx="0" cy="0"/>
+          <a:chOff x="0" y="0"/>
+          <a:chExt cx="0" cy="0"/>
+        </a:xfrm>
+      </p:grpSpPr>
+      <p:sp>
+        <p:nvSpPr>
+          <p:cNvPr id="2" name="Titolo 1"/>
+          <p:cNvSpPr>
+            <a:spLocks noGrp="1"/>
+          </p:cNvSpPr>
+          <p:nvPr>
+            <p:ph type="title"/>
+          </p:nvPr>
+        </p:nvSpPr>
+        <p:spPr/>
+        <p:txBody>
+          <a:bodyPr/>
+          <a:lstStyle/>
+          <a:p>
+            <a:r>
+              <a:rPr lang="it-IT" dirty="0" err="1" smtClean="0"/>
+              <a:t>Function</a:t>
+            </a:r>
+            <a:r>
+              <a:rPr lang="it-IT" dirty="0" smtClean="0"/>
+              <a:t> </a:t>
+            </a:r>
+            <a:r>
+              <a:rPr lang="it-IT" dirty="0" err="1" smtClean="0"/>
+              <a:t>Points</a:t>
+            </a:r>
+            <a:endParaRPr lang="it-IT" dirty="0"/>
+          </a:p>
+        </p:txBody>
+      </p:sp>
+      <p:sp>
+        <p:nvSpPr>
+          <p:cNvPr id="3" name="Segnaposto contenuto 2"/>
+          <p:cNvSpPr>
+            <a:spLocks noGrp="1"/>
+          </p:cNvSpPr>
+          <p:nvPr>
+            <p:ph idx="1"/>
+          </p:nvPr>
+        </p:nvSpPr>
+        <p:spPr>
+          <a:xfrm>
+            <a:off x="1261872" y="2227385"/>
+            <a:ext cx="8595360" cy="3952752"/>
+          </a:xfrm>
+        </p:spPr>
+        <p:txBody>
+          <a:bodyPr/>
+          <a:lstStyle/>
+          <a:p>
+            <a:r>
+              <a:rPr lang="it-IT" sz="2000" dirty="0" err="1" smtClean="0"/>
+              <a:t>Identify</a:t>
+            </a:r>
+            <a:r>
+              <a:rPr lang="it-IT" sz="2000" dirty="0" smtClean="0"/>
+              <a:t> </a:t>
+            </a:r>
+            <a:r>
+              <a:rPr lang="it-IT" sz="2000" dirty="0" err="1" smtClean="0"/>
+              <a:t>all</a:t>
+            </a:r>
+            <a:r>
+              <a:rPr lang="it-IT" sz="2000" dirty="0" smtClean="0"/>
+              <a:t> the </a:t>
+            </a:r>
+            <a:r>
+              <a:rPr lang="it-IT" sz="2000" dirty="0" err="1" smtClean="0"/>
+              <a:t>features</a:t>
+            </a:r>
+            <a:r>
+              <a:rPr lang="it-IT" sz="2000" dirty="0" smtClean="0"/>
+              <a:t> of the </a:t>
+            </a:r>
+            <a:r>
+              <a:rPr lang="it-IT" sz="2000" dirty="0" err="1" smtClean="0"/>
+              <a:t>project</a:t>
+            </a:r>
+            <a:r>
+              <a:rPr lang="it-IT" sz="2000" dirty="0" smtClean="0"/>
+              <a:t>, and </a:t>
+            </a:r>
+            <a:r>
+              <a:rPr lang="it-IT" sz="2000" dirty="0" err="1" smtClean="0"/>
+              <a:t>assign</a:t>
+            </a:r>
+            <a:r>
+              <a:rPr lang="it-IT" sz="2000" dirty="0" smtClean="0"/>
+              <a:t> </a:t>
+            </a:r>
+            <a:r>
+              <a:rPr lang="it-IT" sz="2000" dirty="0" err="1" smtClean="0"/>
+              <a:t>them</a:t>
+            </a:r>
+            <a:r>
+              <a:rPr lang="it-IT" sz="2000" dirty="0" smtClean="0"/>
+              <a:t> a </a:t>
+            </a:r>
+            <a:r>
+              <a:rPr lang="it-IT" sz="2000" dirty="0" err="1" smtClean="0"/>
+              <a:t>weight</a:t>
+            </a:r>
+            <a:endParaRPr lang="it-IT" sz="2000" dirty="0" smtClean="0"/>
+          </a:p>
+          <a:p>
+            <a:endParaRPr lang="it-IT" sz="2000" dirty="0"/>
+          </a:p>
+          <a:p>
+            <a:r>
+              <a:rPr lang="it-IT" dirty="0" err="1" smtClean="0"/>
+              <a:t>Resulting</a:t>
+            </a:r>
+            <a:r>
+              <a:rPr lang="it-IT" dirty="0" smtClean="0"/>
+              <a:t> </a:t>
+            </a:r>
+            <a:r>
+              <a:rPr lang="it-IT" dirty="0" err="1" smtClean="0"/>
+              <a:t>total</a:t>
+            </a:r>
+            <a:r>
+              <a:rPr lang="it-IT" dirty="0" smtClean="0"/>
+              <a:t> </a:t>
+            </a:r>
+            <a:r>
+              <a:rPr lang="it-IT" dirty="0" err="1" smtClean="0"/>
+              <a:t>function</a:t>
+            </a:r>
+            <a:r>
+              <a:rPr lang="it-IT" dirty="0" smtClean="0"/>
+              <a:t> </a:t>
+            </a:r>
+            <a:r>
+              <a:rPr lang="it-IT" dirty="0" err="1" smtClean="0"/>
+              <a:t>points</a:t>
+            </a:r>
+            <a:r>
+              <a:rPr lang="it-IT" dirty="0" smtClean="0"/>
+              <a:t>: 134</a:t>
+            </a:r>
+          </a:p>
+          <a:p>
+            <a:endParaRPr lang="it-IT" sz="2000" dirty="0"/>
+          </a:p>
+          <a:p>
+            <a:r>
+              <a:rPr lang="it-IT" sz="2000" dirty="0" smtClean="0"/>
+              <a:t>Source Lines of Code </a:t>
+            </a:r>
+            <a:r>
+              <a:rPr lang="it-IT" sz="2000" dirty="0" err="1" smtClean="0"/>
+              <a:t>calculated</a:t>
+            </a:r>
+            <a:r>
+              <a:rPr lang="it-IT" sz="2000" dirty="0" smtClean="0"/>
+              <a:t> </a:t>
+            </a:r>
+            <a:r>
+              <a:rPr lang="it-IT" sz="2000" dirty="0" err="1" smtClean="0"/>
+              <a:t>multiplying</a:t>
+            </a:r>
+            <a:r>
+              <a:rPr lang="it-IT" sz="2000" dirty="0" smtClean="0"/>
+              <a:t> </a:t>
+            </a:r>
+            <a:r>
+              <a:rPr lang="it-IT" sz="2000" dirty="0" err="1" smtClean="0"/>
+              <a:t>function</a:t>
+            </a:r>
+            <a:r>
+              <a:rPr lang="it-IT" sz="2000" dirty="0" smtClean="0"/>
+              <a:t> </a:t>
+            </a:r>
+            <a:r>
+              <a:rPr lang="it-IT" sz="2000" dirty="0" err="1" smtClean="0"/>
+              <a:t>points</a:t>
+            </a:r>
+            <a:r>
+              <a:rPr lang="it-IT" sz="2000" dirty="0" smtClean="0"/>
+              <a:t> and </a:t>
+            </a:r>
+            <a:r>
+              <a:rPr lang="it-IT" sz="2000" dirty="0" err="1" smtClean="0"/>
+              <a:t>language-based</a:t>
+            </a:r>
+            <a:r>
+              <a:rPr lang="it-IT" sz="2000" dirty="0" smtClean="0"/>
+              <a:t> </a:t>
+            </a:r>
+            <a:r>
+              <a:rPr lang="it-IT" sz="2000" dirty="0" err="1" smtClean="0"/>
+              <a:t>converting</a:t>
+            </a:r>
+            <a:r>
+              <a:rPr lang="it-IT" sz="2000" dirty="0" smtClean="0"/>
+              <a:t> </a:t>
+            </a:r>
+            <a:r>
+              <a:rPr lang="it-IT" sz="2000" dirty="0" err="1" smtClean="0"/>
+              <a:t>factor</a:t>
+            </a:r>
+            <a:endParaRPr lang="it-IT" sz="2000" dirty="0" smtClean="0"/>
+          </a:p>
+          <a:p>
+            <a:endParaRPr lang="it-IT" sz="2000" dirty="0"/>
+          </a:p>
+          <a:p>
+            <a:r>
+              <a:rPr lang="it-IT" sz="2000" dirty="0" smtClean="0"/>
+              <a:t>SLOC: 6164</a:t>
+            </a:r>
+          </a:p>
+        </p:txBody>
+      </p:sp>
+    </p:spTree>
+    <p:extLst>
+      <p:ext uri="{BB962C8B-B14F-4D97-AF65-F5344CB8AC3E}">
+        <p14:creationId xmlns:p14="http://schemas.microsoft.com/office/powerpoint/2010/main" val="3121338094"/>
+      </p:ext>
+    </p:extLst>
+  </p:cSld>
+  <p:clrMapOvr>
+    <a:masterClrMapping/>
+  </p:clrMapOvr>
+  <p:timing>
+    <p:tnLst>
+      <p:par>
+        <p:cTn id="1" dur="indefinite" restart="never" nodeType="tmRoot"/>
+      </p:par>
+    </p:tnLst>
+  </p:timing>
+</p:sld>
+</file>
+
+<file path=ppt/slides/slide9.xml><?xml version="1.0" encoding="utf-8"?>
+<p:sld xmlns:a="http://schemas.openxmlformats.org/drawingml/2006/main" xmlns:r="http://schemas.openxmlformats.org/officeDocument/2006/relationships" xmlns:p="http://schemas.openxmlformats.org/presentationml/2006/main">
+  <p:cSld>
+    <p:spTree>
+      <p:nvGrpSpPr>
+        <p:cNvPr id="1" name=""/>
+        <p:cNvGrpSpPr/>
+        <p:nvPr/>
+      </p:nvGrpSpPr>
+      <p:grpSpPr>
+        <a:xfrm>
+          <a:off x="0" y="0"/>
+          <a:ext cx="0" cy="0"/>
+          <a:chOff x="0" y="0"/>
+          <a:chExt cx="0" cy="0"/>
+        </a:xfrm>
+      </p:grpSpPr>
+      <p:sp>
+        <p:nvSpPr>
+          <p:cNvPr id="2" name="Titolo 1"/>
+          <p:cNvSpPr>
+            <a:spLocks noGrp="1"/>
+          </p:cNvSpPr>
+          <p:nvPr>
+            <p:ph type="title"/>
+          </p:nvPr>
+        </p:nvSpPr>
+        <p:spPr/>
+        <p:txBody>
+          <a:bodyPr/>
+          <a:lstStyle/>
+          <a:p>
+            <a:r>
+              <a:rPr lang="it-IT" dirty="0" smtClean="0"/>
+              <a:t>COCOMO II </a:t>
+            </a:r>
+            <a:r>
+              <a:rPr lang="it-IT" dirty="0" err="1" smtClean="0"/>
+              <a:t>Analisys</a:t>
+            </a:r>
+            <a:endParaRPr lang="it-IT" dirty="0"/>
+          </a:p>
+        </p:txBody>
+      </p:sp>
+      <p:sp>
+        <p:nvSpPr>
+          <p:cNvPr id="3" name="Segnaposto contenuto 2"/>
+          <p:cNvSpPr>
+            <a:spLocks noGrp="1"/>
+          </p:cNvSpPr>
+          <p:nvPr>
+            <p:ph idx="1"/>
+          </p:nvPr>
+        </p:nvSpPr>
+        <p:spPr>
+          <a:xfrm>
+            <a:off x="1261872" y="2907323"/>
+            <a:ext cx="8595360" cy="3272814"/>
+          </a:xfrm>
+        </p:spPr>
+        <p:txBody>
+          <a:bodyPr/>
+          <a:lstStyle/>
+          <a:p>
+            <a:r>
+              <a:rPr lang="it-IT" sz="2000" dirty="0" err="1" smtClean="0"/>
+              <a:t>Approach</a:t>
+            </a:r>
+            <a:r>
+              <a:rPr lang="it-IT" sz="2000" dirty="0" smtClean="0"/>
+              <a:t> </a:t>
+            </a:r>
+            <a:r>
+              <a:rPr lang="it-IT" sz="2000" dirty="0" err="1" smtClean="0"/>
+              <a:t>based</a:t>
+            </a:r>
+            <a:r>
+              <a:rPr lang="it-IT" sz="2000" dirty="0" smtClean="0"/>
+              <a:t> on </a:t>
+            </a:r>
+            <a:r>
+              <a:rPr lang="it-IT" sz="2000" dirty="0" err="1" smtClean="0"/>
+              <a:t>effort</a:t>
+            </a:r>
+            <a:r>
+              <a:rPr lang="it-IT" sz="2000" dirty="0" smtClean="0"/>
+              <a:t> and </a:t>
+            </a:r>
+            <a:r>
+              <a:rPr lang="it-IT" sz="2000" dirty="0" err="1" smtClean="0"/>
+              <a:t>duration</a:t>
+            </a:r>
+            <a:r>
+              <a:rPr lang="it-IT" sz="2000" dirty="0" smtClean="0"/>
+              <a:t> </a:t>
+            </a:r>
+            <a:r>
+              <a:rPr lang="it-IT" sz="2000" dirty="0" err="1" smtClean="0"/>
+              <a:t>using</a:t>
+            </a:r>
+            <a:r>
+              <a:rPr lang="it-IT" sz="2000" dirty="0" smtClean="0"/>
+              <a:t> </a:t>
+            </a:r>
+            <a:r>
+              <a:rPr lang="it-IT" sz="2000" dirty="0" err="1" smtClean="0"/>
+              <a:t>parameters</a:t>
+            </a:r>
+            <a:r>
+              <a:rPr lang="it-IT" sz="2000" dirty="0" smtClean="0"/>
+              <a:t> </a:t>
+            </a:r>
+            <a:r>
+              <a:rPr lang="it-IT" sz="2000" dirty="0" err="1" smtClean="0"/>
+              <a:t>derived</a:t>
+            </a:r>
+            <a:r>
+              <a:rPr lang="it-IT" sz="2000" dirty="0" smtClean="0"/>
+              <a:t> from </a:t>
+            </a:r>
+            <a:r>
+              <a:rPr lang="it-IT" sz="2000" dirty="0" err="1" smtClean="0"/>
+              <a:t>previous</a:t>
+            </a:r>
+            <a:r>
+              <a:rPr lang="it-IT" sz="2000" dirty="0" smtClean="0"/>
+              <a:t> </a:t>
+            </a:r>
+            <a:r>
+              <a:rPr lang="it-IT" sz="2000" dirty="0" err="1" smtClean="0"/>
+              <a:t>experiences</a:t>
+            </a:r>
+            <a:endParaRPr lang="it-IT" sz="2000" dirty="0" smtClean="0"/>
+          </a:p>
+          <a:p>
+            <a:endParaRPr lang="it-IT" sz="2000" dirty="0"/>
+          </a:p>
+          <a:p>
+            <a:r>
+              <a:rPr lang="it-IT" dirty="0" err="1" smtClean="0"/>
+              <a:t>Effort</a:t>
+            </a:r>
+            <a:r>
+              <a:rPr lang="it-IT" dirty="0" smtClean="0"/>
+              <a:t> (in </a:t>
+            </a:r>
+            <a:r>
+              <a:rPr lang="it-IT" dirty="0" err="1"/>
+              <a:t>P</a:t>
+            </a:r>
+            <a:r>
+              <a:rPr lang="it-IT" dirty="0" err="1" smtClean="0"/>
+              <a:t>ersons-Month</a:t>
+            </a:r>
+            <a:r>
+              <a:rPr lang="it-IT" dirty="0" smtClean="0"/>
+              <a:t>): 11.52</a:t>
+            </a:r>
+          </a:p>
+          <a:p>
+            <a:endParaRPr lang="it-IT" dirty="0"/>
+          </a:p>
+          <a:p>
+            <a:r>
+              <a:rPr lang="it-IT" dirty="0" err="1" smtClean="0"/>
+              <a:t>Expected</a:t>
+            </a:r>
+            <a:r>
+              <a:rPr lang="it-IT" dirty="0" smtClean="0"/>
+              <a:t> </a:t>
+            </a:r>
+            <a:r>
+              <a:rPr lang="it-IT" dirty="0" err="1" smtClean="0"/>
+              <a:t>D</a:t>
+            </a:r>
+            <a:r>
+              <a:rPr lang="it-IT" dirty="0" err="1" smtClean="0"/>
+              <a:t>uration</a:t>
+            </a:r>
+            <a:r>
+              <a:rPr lang="it-IT" dirty="0" smtClean="0"/>
+              <a:t> of the </a:t>
+            </a:r>
+            <a:r>
+              <a:rPr lang="it-IT" dirty="0" err="1" smtClean="0"/>
+              <a:t>projec</a:t>
+            </a:r>
+            <a:r>
+              <a:rPr lang="it-IT" dirty="0" err="1" smtClean="0"/>
+              <a:t>t</a:t>
+            </a:r>
+            <a:r>
+              <a:rPr lang="it-IT" dirty="0" smtClean="0"/>
+              <a:t>: 8 </a:t>
+            </a:r>
+            <a:r>
+              <a:rPr lang="it-IT" dirty="0" err="1" smtClean="0"/>
+              <a:t>months</a:t>
+            </a:r>
+            <a:endParaRPr lang="it-IT" dirty="0"/>
+          </a:p>
+        </p:txBody>
+      </p:sp>
+    </p:spTree>
+    <p:extLst>
+      <p:ext uri="{BB962C8B-B14F-4D97-AF65-F5344CB8AC3E}">
+        <p14:creationId xmlns:p14="http://schemas.microsoft.com/office/powerpoint/2010/main" val="1660477856"/>
       </p:ext>
     </p:extLst>
   </p:cSld>

</xml_diff>

<commit_message>
Presentation layout and miscellaneous
</commit_message>
<xml_diff>
--- a/Slides.pptx
+++ b/Slides.pptx
@@ -299,7 +299,7 @@
           <a:p>
             <a:fld id="{9E016143-E03C-4CFD-AFDC-14E5BDEA754C}" type="datetimeFigureOut">
               <a:rPr lang="en-US" dirty="0"/>
-              <a:t>2/27/2016</a:t>
+              <a:t>2/28/2016</a:t>
             </a:fld>
             <a:endParaRPr lang="en-US" dirty="0"/>
           </a:p>
@@ -523,7 +523,7 @@
           <a:p>
             <a:fld id="{C033E54A-A8CA-48C1-9504-691B58049D29}" type="datetimeFigureOut">
               <a:rPr lang="en-US" dirty="0"/>
-              <a:t>2/27/2016</a:t>
+              <a:t>2/28/2016</a:t>
             </a:fld>
             <a:endParaRPr lang="en-US" dirty="0"/>
           </a:p>
@@ -698,7 +698,7 @@
           <a:p>
             <a:fld id="{B5F6C806-BBF7-471C-9527-881CE2266695}" type="datetimeFigureOut">
               <a:rPr lang="en-US" dirty="0"/>
-              <a:t>2/27/2016</a:t>
+              <a:t>2/28/2016</a:t>
             </a:fld>
             <a:endParaRPr lang="en-US" dirty="0"/>
           </a:p>
@@ -863,7 +863,7 @@
           <a:p>
             <a:fld id="{78C94063-DF36-4330-A365-08DA1FA5B7D6}" type="datetimeFigureOut">
               <a:rPr lang="en-US" dirty="0"/>
-              <a:t>2/27/2016</a:t>
+              <a:t>2/28/2016</a:t>
             </a:fld>
             <a:endParaRPr lang="en-US" dirty="0"/>
           </a:p>
@@ -1112,7 +1112,7 @@
           <a:p>
             <a:fld id="{908A7C6C-0F39-4D70-8E8D-FE5B9C95FA73}" type="datetimeFigureOut">
               <a:rPr lang="en-US" dirty="0"/>
-              <a:t>2/27/2016</a:t>
+              <a:t>2/28/2016</a:t>
             </a:fld>
             <a:endParaRPr lang="en-US" dirty="0"/>
           </a:p>
@@ -1433,7 +1433,7 @@
           <a:p>
             <a:fld id="{DFCFA4AC-08CC-42CE-BD01-C191750A04EC}" type="datetimeFigureOut">
               <a:rPr lang="en-US" dirty="0"/>
-              <a:t>2/27/2016</a:t>
+              <a:t>2/28/2016</a:t>
             </a:fld>
             <a:endParaRPr lang="en-US" dirty="0"/>
           </a:p>
@@ -1879,7 +1879,7 @@
           <a:p>
             <a:fld id="{1BA7A723-92A7-435B-B681-F25B092FEFEB}" type="datetimeFigureOut">
               <a:rPr lang="en-US" dirty="0"/>
-              <a:t>2/27/2016</a:t>
+              <a:t>2/28/2016</a:t>
             </a:fld>
             <a:endParaRPr lang="en-US" dirty="0"/>
           </a:p>
@@ -1992,7 +1992,7 @@
           <a:p>
             <a:fld id="{4F170639-886C-4FCF-9EAB-ABB5DA3F3F4A}" type="datetimeFigureOut">
               <a:rPr lang="en-US" dirty="0"/>
-              <a:t>2/27/2016</a:t>
+              <a:t>2/28/2016</a:t>
             </a:fld>
             <a:endParaRPr lang="en-US" dirty="0"/>
           </a:p>
@@ -2082,7 +2082,7 @@
           <a:p>
             <a:fld id="{22230651-31F4-45D2-98AE-A2108F41BC07}" type="datetimeFigureOut">
               <a:rPr lang="en-US" dirty="0"/>
-              <a:t>2/27/2016</a:t>
+              <a:t>2/28/2016</a:t>
             </a:fld>
             <a:endParaRPr lang="en-US" dirty="0"/>
           </a:p>
@@ -2364,7 +2364,7 @@
           <a:p>
             <a:fld id="{6F53789A-C914-4DB1-8815-80B5EC7335C5}" type="datetimeFigureOut">
               <a:rPr lang="en-US" dirty="0"/>
-              <a:t>2/27/2016</a:t>
+              <a:t>2/28/2016</a:t>
             </a:fld>
             <a:endParaRPr lang="en-US" dirty="0"/>
           </a:p>
@@ -2684,7 +2684,7 @@
           <a:p>
             <a:fld id="{5E6440AA-91A0-436F-8FDB-C0F939DCAE21}" type="datetimeFigureOut">
               <a:rPr lang="en-US" dirty="0"/>
-              <a:t>2/27/2016</a:t>
+              <a:t>2/28/2016</a:t>
             </a:fld>
             <a:endParaRPr lang="en-US" dirty="0"/>
           </a:p>
@@ -2933,7 +2933,7 @@
           <a:p>
             <a:fld id="{0E59FD0C-5451-4CA0-86AF-E70AE3279989}" type="datetimeFigureOut">
               <a:rPr lang="en-US" dirty="0"/>
-              <a:t>2/27/2016</a:t>
+              <a:t>2/28/2016</a:t>
             </a:fld>
             <a:endParaRPr lang="en-US" dirty="0"/>
           </a:p>
@@ -3597,23 +3597,23 @@
           <a:bodyPr/>
           <a:lstStyle/>
           <a:p>
-            <a:pPr marL="0" indent="0">
+            <a:pPr marL="0" indent="0" algn="just">
               <a:buNone/>
             </a:pPr>
             <a:r>
-              <a:rPr lang="it-IT" dirty="0" smtClean="0"/>
+              <a:rPr lang="it-IT" sz="2000" b="1" dirty="0" smtClean="0"/>
               <a:t>Three-</a:t>
             </a:r>
             <a:r>
-              <a:rPr lang="it-IT" dirty="0" err="1" smtClean="0"/>
+              <a:rPr lang="it-IT" sz="2000" b="1" dirty="0" err="1" smtClean="0"/>
               <a:t>tier</a:t>
             </a:r>
             <a:r>
-              <a:rPr lang="it-IT" dirty="0" smtClean="0"/>
+              <a:rPr lang="it-IT" sz="2000" b="1" dirty="0" smtClean="0"/>
               <a:t> </a:t>
             </a:r>
             <a:r>
-              <a:rPr lang="it-IT" dirty="0" err="1" smtClean="0"/>
+              <a:rPr lang="it-IT" sz="2000" b="1" dirty="0" err="1" smtClean="0"/>
               <a:t>architecture</a:t>
             </a:r>
             <a:r>
@@ -3699,6 +3699,13 @@
   <p:clrMapOvr>
     <a:masterClrMapping/>
   </p:clrMapOvr>
+  <p:timing>
+    <p:tnLst>
+      <p:par>
+        <p:cTn id="1" dur="indefinite" restart="never" nodeType="tmRoot"/>
+      </p:par>
+    </p:tnLst>
+  </p:timing>
 </p:sld>
 </file>
 
@@ -3814,8 +3821,8 @@
         </p:nvSpPr>
         <p:spPr>
           <a:xfrm>
-            <a:off x="1086928" y="2182483"/>
-            <a:ext cx="3157268" cy="369332"/>
+            <a:off x="1261872" y="2182483"/>
+            <a:ext cx="2982324" cy="369332"/>
           </a:xfrm>
           <a:prstGeom prst="rect">
             <a:avLst/>
@@ -3850,6 +3857,13 @@
   <p:clrMapOvr>
     <a:masterClrMapping/>
   </p:clrMapOvr>
+  <p:timing>
+    <p:tnLst>
+      <p:par>
+        <p:cTn id="1" dur="indefinite" restart="never" nodeType="tmRoot"/>
+      </p:par>
+    </p:tnLst>
+  </p:timing>
 </p:sld>
 </file>
 
@@ -3935,7 +3949,7 @@
         <p:spPr>
           <a:xfrm>
             <a:off x="1261872" y="1842542"/>
-            <a:ext cx="2527539" cy="369332"/>
+            <a:ext cx="2939192" cy="369332"/>
           </a:xfrm>
           <a:prstGeom prst="rect">
             <a:avLst/>
@@ -3949,11 +3963,11 @@
           <a:lstStyle/>
           <a:p>
             <a:r>
-              <a:rPr lang="it-IT" dirty="0" smtClean="0"/>
+              <a:rPr lang="it-IT" b="1" dirty="0" smtClean="0"/>
               <a:t>Component </a:t>
             </a:r>
             <a:r>
-              <a:rPr lang="it-IT" dirty="0" err="1" smtClean="0"/>
+              <a:rPr lang="it-IT" b="1" dirty="0" err="1" smtClean="0"/>
               <a:t>Diagram</a:t>
             </a:r>
             <a:r>
@@ -4001,6 +4015,13 @@
   <p:clrMapOvr>
     <a:masterClrMapping/>
   </p:clrMapOvr>
+  <p:timing>
+    <p:tnLst>
+      <p:par>
+        <p:cTn id="1" dur="indefinite" restart="never" nodeType="tmRoot"/>
+      </p:par>
+    </p:tnLst>
+  </p:timing>
 </p:sld>
 </file>
 
@@ -4067,23 +4088,23 @@
           <a:lstStyle/>
           <a:p>
             <a:r>
-              <a:rPr lang="it-IT" dirty="0" smtClean="0"/>
+              <a:rPr lang="it-IT" b="1" dirty="0" smtClean="0"/>
               <a:t>Component </a:t>
             </a:r>
             <a:r>
-              <a:rPr lang="it-IT" dirty="0" err="1" smtClean="0"/>
+              <a:rPr lang="it-IT" b="1" dirty="0" err="1" smtClean="0"/>
               <a:t>Diagram</a:t>
             </a:r>
             <a:r>
-              <a:rPr lang="it-IT" dirty="0" smtClean="0"/>
+              <a:rPr lang="it-IT" b="1" dirty="0" smtClean="0"/>
               <a:t>: </a:t>
             </a:r>
             <a:r>
-              <a:rPr lang="it-IT" dirty="0"/>
+              <a:rPr lang="it-IT" b="1" dirty="0"/>
               <a:t>U</a:t>
             </a:r>
             <a:r>
-              <a:rPr lang="it-IT" dirty="0" smtClean="0"/>
+              <a:rPr lang="it-IT" b="1" dirty="0" smtClean="0"/>
               <a:t>ser Management</a:t>
             </a:r>
           </a:p>
@@ -4160,6 +4181,13 @@
   <p:clrMapOvr>
     <a:masterClrMapping/>
   </p:clrMapOvr>
+  <p:timing>
+    <p:tnLst>
+      <p:par>
+        <p:cTn id="1" dur="indefinite" restart="never" nodeType="tmRoot"/>
+      </p:par>
+    </p:tnLst>
+  </p:timing>
 </p:sld>
 </file>
 
@@ -4352,6 +4380,13 @@
   <p:clrMapOvr>
     <a:masterClrMapping/>
   </p:clrMapOvr>
+  <p:timing>
+    <p:tnLst>
+      <p:par>
+        <p:cTn id="1" dur="indefinite" restart="never" nodeType="tmRoot"/>
+      </p:par>
+    </p:tnLst>
+  </p:timing>
 </p:sld>
 </file>
 
@@ -4389,7 +4424,15 @@
           <a:p>
             <a:r>
               <a:rPr lang="it-IT" dirty="0" smtClean="0"/>
-              <a:t>Integration Test Plan</a:t>
+              <a:t>Integration </a:t>
+            </a:r>
+            <a:r>
+              <a:rPr lang="it-IT" dirty="0" smtClean="0"/>
+              <a:t>Test: </a:t>
+            </a:r>
+            <a:r>
+              <a:rPr lang="it-IT" dirty="0" smtClean="0"/>
+              <a:t>Plan</a:t>
             </a:r>
             <a:endParaRPr lang="it-IT" dirty="0"/>
           </a:p>
@@ -4410,31 +4453,50 @@
           <a:bodyPr/>
           <a:lstStyle/>
           <a:p>
+            <a:pPr marL="0" indent="0">
+              <a:buNone/>
+            </a:pPr>
             <a:endParaRPr lang="en-US" sz="2000" dirty="0" smtClean="0"/>
           </a:p>
           <a:p>
-            <a:endParaRPr lang="en-US" sz="2000" dirty="0"/>
-          </a:p>
-          <a:p>
-            <a:endParaRPr lang="en-US" sz="2000" dirty="0" smtClean="0"/>
-          </a:p>
-          <a:p>
             <a:r>
               <a:rPr lang="en-US" sz="2000" dirty="0" smtClean="0"/>
-              <a:t>Created in order to have a point of reference about how to verify </a:t>
+              <a:t>Created in order to have a </a:t>
+            </a:r>
+            <a:r>
+              <a:rPr lang="en-US" sz="2000" dirty="0" smtClean="0"/>
+              <a:t>reference on the verification of functionalities, performances, </a:t>
             </a:r>
             <a:r>
               <a:rPr lang="en-US" sz="2000" dirty="0"/>
-              <a:t>functional, performance, and reliability requirements of the </a:t>
+              <a:t>and reliability requirements of the </a:t>
             </a:r>
             <a:r>
               <a:rPr lang="en-US" sz="2000" dirty="0" smtClean="0"/>
               <a:t>project</a:t>
             </a:r>
-            <a:endParaRPr lang="en-US" sz="2000" dirty="0"/>
-          </a:p>
-          <a:p>
             <a:endParaRPr lang="it-IT" dirty="0" smtClean="0"/>
+          </a:p>
+          <a:p>
+            <a:r>
+              <a:rPr lang="en-US" sz="2000" dirty="0" smtClean="0"/>
+              <a:t>Individual </a:t>
+            </a:r>
+            <a:r>
+              <a:rPr lang="en-US" sz="2000" dirty="0"/>
+              <a:t>software modules are combined and tested as a </a:t>
+            </a:r>
+            <a:r>
+              <a:rPr lang="en-US" sz="2000" dirty="0" smtClean="0"/>
+              <a:t>group</a:t>
+            </a:r>
+          </a:p>
+          <a:p>
+            <a:r>
+              <a:rPr lang="en-US" sz="2000" dirty="0" smtClean="0"/>
+              <a:t>Requires Unit Test</a:t>
+            </a:r>
+            <a:endParaRPr lang="it-IT" sz="2000" dirty="0" smtClean="0"/>
           </a:p>
           <a:p>
             <a:r>
@@ -4491,6 +4553,13 @@
   <p:clrMapOvr>
     <a:masterClrMapping/>
   </p:clrMapOvr>
+  <p:timing>
+    <p:tnLst>
+      <p:par>
+        <p:cTn id="1" dur="indefinite" restart="never" nodeType="tmRoot"/>
+      </p:par>
+    </p:tnLst>
+  </p:timing>
 </p:sld>
 </file>
 
@@ -4511,6 +4580,33 @@
           <a:chExt cx="0" cy="0"/>
         </a:xfrm>
       </p:grpSpPr>
+      <p:sp>
+        <p:nvSpPr>
+          <p:cNvPr id="2" name="Titolo 1"/>
+          <p:cNvSpPr>
+            <a:spLocks noGrp="1"/>
+          </p:cNvSpPr>
+          <p:nvPr>
+            <p:ph type="title"/>
+          </p:nvPr>
+        </p:nvSpPr>
+        <p:spPr/>
+        <p:txBody>
+          <a:bodyPr/>
+          <a:lstStyle/>
+          <a:p>
+            <a:r>
+              <a:rPr lang="it-IT" dirty="0" smtClean="0"/>
+              <a:t>Integration Test: </a:t>
+            </a:r>
+            <a:r>
+              <a:rPr lang="it-IT" dirty="0" err="1" smtClean="0"/>
+              <a:t>Sequence</a:t>
+            </a:r>
+            <a:endParaRPr lang="it-IT" dirty="0"/>
+          </a:p>
+        </p:txBody>
+      </p:sp>
       <p:pic>
         <p:nvPicPr>
           <p:cNvPr id="4" name="Segnaposto contenuto 3"/>
@@ -4529,8 +4625,8 @@
         </p:blipFill>
         <p:spPr>
           <a:xfrm>
-            <a:off x="2001079" y="424069"/>
-            <a:ext cx="7238324" cy="5924062"/>
+            <a:off x="2857949" y="2165230"/>
+            <a:ext cx="5316689" cy="4351338"/>
           </a:xfrm>
           <a:prstGeom prst="rect">
             <a:avLst/>
@@ -4575,6 +4671,13 @@
   <p:clrMapOvr>
     <a:masterClrMapping/>
   </p:clrMapOvr>
+  <p:timing>
+    <p:tnLst>
+      <p:par>
+        <p:cTn id="1" dur="indefinite" restart="never" nodeType="tmRoot"/>
+      </p:par>
+    </p:tnLst>
+  </p:timing>
 </p:sld>
 </file>
 
@@ -4650,8 +4753,8 @@
         </p:nvSpPr>
         <p:spPr>
           <a:xfrm>
-            <a:off x="1261872" y="2907323"/>
-            <a:ext cx="8595360" cy="3272814"/>
+            <a:off x="1261872" y="2493256"/>
+            <a:ext cx="5682391" cy="3272814"/>
           </a:xfrm>
         </p:spPr>
         <p:txBody>
@@ -4680,11 +4783,23 @@
             </a:r>
             <a:r>
               <a:rPr lang="it-IT" sz="2000" dirty="0" err="1" smtClean="0"/>
-              <a:t>throughFunction</a:t>
+              <a:t>through</a:t>
             </a:r>
             <a:r>
               <a:rPr lang="it-IT" sz="2000" dirty="0" smtClean="0"/>
-              <a:t> Point Analysis</a:t>
+              <a:t> </a:t>
+            </a:r>
+            <a:r>
+              <a:rPr lang="it-IT" sz="2000" dirty="0" err="1" smtClean="0"/>
+              <a:t>Function</a:t>
+            </a:r>
+            <a:r>
+              <a:rPr lang="it-IT" sz="2000" dirty="0" smtClean="0"/>
+              <a:t> </a:t>
+            </a:r>
+            <a:r>
+              <a:rPr lang="it-IT" sz="2000" dirty="0" smtClean="0"/>
+              <a:t>Point Analysis</a:t>
             </a:r>
             <a:endParaRPr lang="it-IT" sz="2000" dirty="0"/>
           </a:p>
@@ -4702,7 +4817,11 @@
             </a:r>
             <a:r>
               <a:rPr lang="it-IT" sz="2000" dirty="0" smtClean="0"/>
-              <a:t>  to </a:t>
+              <a:t> </a:t>
+            </a:r>
+            <a:r>
+              <a:rPr lang="it-IT" sz="2000" dirty="0" smtClean="0"/>
+              <a:t>to </a:t>
             </a:r>
             <a:r>
               <a:rPr lang="it-IT" sz="2000" dirty="0" err="1" smtClean="0"/>
@@ -4753,6 +4872,36 @@
           <a:xfrm>
             <a:off x="11426735" y="155275"/>
             <a:ext cx="632993" cy="677562"/>
+          </a:xfrm>
+          <a:prstGeom prst="rect">
+            <a:avLst/>
+          </a:prstGeom>
+        </p:spPr>
+      </p:pic>
+      <p:pic>
+        <p:nvPicPr>
+          <p:cNvPr id="5" name="Immagine 4"/>
+          <p:cNvPicPr>
+            <a:picLocks noChangeAspect="1"/>
+          </p:cNvPicPr>
+          <p:nvPr/>
+        </p:nvPicPr>
+        <p:blipFill>
+          <a:blip r:embed="rId3">
+            <a:extLst>
+              <a:ext uri="{28A0092B-C50C-407E-A947-70E740481C1C}">
+                <a14:useLocalDpi xmlns:a14="http://schemas.microsoft.com/office/drawing/2010/main" val="0"/>
+              </a:ext>
+            </a:extLst>
+          </a:blip>
+          <a:stretch>
+            <a:fillRect/>
+          </a:stretch>
+        </p:blipFill>
+        <p:spPr>
+          <a:xfrm>
+            <a:off x="7297945" y="2553641"/>
+            <a:ext cx="3048000" cy="2033016"/>
           </a:xfrm>
           <a:prstGeom prst="rect">
             <a:avLst/>
@@ -4877,7 +5026,7 @@
             </a:r>
             <a:r>
               <a:rPr lang="it-IT" sz="2000" dirty="0" smtClean="0"/>
-              <a:t>, and </a:t>
+              <a:t>, </a:t>
             </a:r>
             <a:r>
               <a:rPr lang="it-IT" sz="2000" dirty="0" err="1" smtClean="0"/>
@@ -4976,7 +5125,11 @@
             </a:r>
             <a:r>
               <a:rPr lang="it-IT" sz="2000" dirty="0" smtClean="0"/>
-              <a:t> and </a:t>
+              <a:t> </a:t>
+            </a:r>
+            <a:r>
+              <a:rPr lang="it-IT" sz="2000" dirty="0" smtClean="0"/>
+              <a:t>by </a:t>
             </a:r>
             <a:r>
               <a:rPr lang="it-IT" sz="2000" dirty="0" err="1" smtClean="0"/>
@@ -5002,7 +5155,6 @@
               <a:rPr lang="it-IT" sz="2000" dirty="0" smtClean="0"/>
               <a:t> (JEE)</a:t>
             </a:r>
-            <a:endParaRPr lang="it-IT" sz="2000" dirty="0" smtClean="0"/>
           </a:p>
           <a:p>
             <a:endParaRPr lang="it-IT" sz="2000" dirty="0"/>
@@ -5100,8 +5252,8 @@
               <a:t>COCOMO II </a:t>
             </a:r>
             <a:r>
-              <a:rPr lang="it-IT" dirty="0" err="1" smtClean="0"/>
-              <a:t>Analisys</a:t>
+              <a:rPr lang="it-IT" dirty="0" smtClean="0"/>
+              <a:t>Analysis</a:t>
             </a:r>
             <a:endParaRPr lang="it-IT" dirty="0"/>
           </a:p>
@@ -5119,7 +5271,7 @@
         </p:nvSpPr>
         <p:spPr>
           <a:xfrm>
-            <a:off x="1261872" y="2907323"/>
+            <a:off x="1261872" y="2268969"/>
             <a:ext cx="8595360" cy="3272814"/>
           </a:xfrm>
         </p:spPr>
@@ -5382,25 +5534,25 @@
               <a:buNone/>
             </a:pPr>
             <a:r>
-              <a:rPr lang="it-IT" sz="2400" dirty="0" err="1" smtClean="0">
+              <a:rPr lang="it-IT" sz="2400" b="1" dirty="0" err="1" smtClean="0">
                 <a:latin typeface="+mj-lt"/>
               </a:rPr>
               <a:t>Improve</a:t>
             </a:r>
             <a:r>
-              <a:rPr lang="it-IT" sz="2400" dirty="0" smtClean="0">
+              <a:rPr lang="it-IT" sz="2400" b="1" dirty="0" smtClean="0">
                 <a:latin typeface="+mj-lt"/>
               </a:rPr>
               <a:t> Taxi Service of large </a:t>
             </a:r>
             <a:r>
-              <a:rPr lang="it-IT" sz="2400" dirty="0" err="1" smtClean="0">
+              <a:rPr lang="it-IT" sz="2400" b="1" dirty="0" err="1" smtClean="0">
                 <a:latin typeface="+mj-lt"/>
               </a:rPr>
               <a:t>cities</a:t>
             </a:r>
             <a:r>
-              <a:rPr lang="it-IT" sz="2400" dirty="0" smtClean="0">
+              <a:rPr lang="it-IT" sz="2400" b="1" dirty="0" smtClean="0">
                 <a:latin typeface="+mj-lt"/>
               </a:rPr>
               <a:t>:</a:t>
@@ -5578,14 +5730,13 @@
           <a:bodyPr/>
           <a:lstStyle/>
           <a:p>
-            <a:pPr algn="ctr"/>
             <a:r>
               <a:rPr lang="it-IT" dirty="0" smtClean="0"/>
               <a:t>Project </a:t>
             </a:r>
             <a:r>
               <a:rPr lang="it-IT" dirty="0" err="1" smtClean="0"/>
-              <a:t>Developement</a:t>
+              <a:t>Timeline</a:t>
             </a:r>
             <a:endParaRPr lang="it-IT" dirty="0"/>
           </a:p>
@@ -5655,6 +5806,13 @@
   <p:clrMapOvr>
     <a:masterClrMapping/>
   </p:clrMapOvr>
+  <p:timing>
+    <p:tnLst>
+      <p:par>
+        <p:cTn id="1" dur="indefinite" restart="never" nodeType="tmRoot"/>
+      </p:par>
+    </p:tnLst>
+  </p:timing>
 </p:sld>
 </file>
 
@@ -5716,21 +5874,13 @@
         </p:nvSpPr>
         <p:spPr>
           <a:xfrm>
-            <a:off x="1261872" y="1828800"/>
+            <a:off x="1261872" y="2147977"/>
             <a:ext cx="8839660" cy="4351337"/>
           </a:xfrm>
         </p:spPr>
         <p:txBody>
           <a:bodyPr/>
           <a:lstStyle/>
-          <a:p>
-            <a:pPr marL="0" indent="0">
-              <a:buNone/>
-            </a:pPr>
-            <a:endParaRPr lang="it-IT" sz="2400" dirty="0" smtClean="0">
-              <a:latin typeface="+mj-lt"/>
-            </a:endParaRPr>
-          </a:p>
           <a:p>
             <a:pPr marL="0" indent="0">
               <a:buNone/>
@@ -5764,7 +5914,7 @@
             <a:pPr marL="0" indent="0">
               <a:buNone/>
             </a:pPr>
-            <a:endParaRPr lang="it-IT" sz="2400" b="1" dirty="0" smtClean="0">
+            <a:endParaRPr lang="it-IT" b="1" dirty="0" smtClean="0">
               <a:latin typeface="+mj-lt"/>
             </a:endParaRPr>
           </a:p>
@@ -5789,7 +5939,7 @@
             </a:r>
           </a:p>
           <a:p>
-            <a:endParaRPr lang="it-IT" sz="2000" dirty="0">
+            <a:endParaRPr lang="it-IT" sz="2000" dirty="0" smtClean="0">
               <a:latin typeface="+mj-lt"/>
             </a:endParaRPr>
           </a:p>
@@ -5975,7 +6125,12 @@
             <p:ph idx="1"/>
           </p:nvPr>
         </p:nvSpPr>
-        <p:spPr/>
+        <p:spPr>
+          <a:xfrm>
+            <a:off x="715992" y="1828800"/>
+            <a:ext cx="9141240" cy="4351337"/>
+          </a:xfrm>
+        </p:spPr>
         <p:txBody>
           <a:bodyPr/>
           <a:lstStyle/>
@@ -5987,138 +6142,335 @@
           </a:p>
           <a:p>
             <a:pPr marL="548640" lvl="2" indent="0">
+              <a:lnSpc>
+                <a:spcPct val="95000"/>
+              </a:lnSpc>
+              <a:spcBef>
+                <a:spcPts val="1400"/>
+              </a:spcBef>
+              <a:spcAft>
+                <a:spcPts val="200"/>
+              </a:spcAft>
+              <a:buSzPct val="80000"/>
+              <a:buFont typeface="Arial" pitchFamily="34" charset="0"/>
               <a:buNone/>
             </a:pPr>
             <a:r>
-              <a:rPr lang="it-IT" sz="2400" b="1" dirty="0" err="1"/>
+              <a:rPr lang="it-IT" sz="2400" b="1" spc="10" dirty="0" err="1">
+                <a:solidFill>
+                  <a:schemeClr val="tx1"/>
+                </a:solidFill>
+                <a:latin typeface="+mj-lt"/>
+              </a:rPr>
               <a:t>Requirements</a:t>
             </a:r>
             <a:r>
-              <a:rPr lang="it-IT" sz="2400" b="1" dirty="0"/>
+              <a:rPr lang="it-IT" sz="2400" b="1" spc="10" dirty="0">
+                <a:solidFill>
+                  <a:schemeClr val="tx1"/>
+                </a:solidFill>
+                <a:latin typeface="+mj-lt"/>
+              </a:rPr>
               <a:t> </a:t>
             </a:r>
             <a:r>
-              <a:rPr lang="it-IT" sz="2400" b="1" dirty="0" err="1"/>
+              <a:rPr lang="it-IT" sz="2400" b="1" spc="10" dirty="0" err="1">
+                <a:solidFill>
+                  <a:schemeClr val="tx1"/>
+                </a:solidFill>
+                <a:latin typeface="+mj-lt"/>
+              </a:rPr>
               <a:t>introduced</a:t>
             </a:r>
             <a:r>
-              <a:rPr lang="it-IT" sz="2400" b="1" dirty="0"/>
+              <a:rPr lang="it-IT" sz="2400" b="1" spc="10" dirty="0">
+                <a:solidFill>
+                  <a:schemeClr val="tx1"/>
+                </a:solidFill>
+                <a:latin typeface="+mj-lt"/>
+              </a:rPr>
               <a:t>: </a:t>
             </a:r>
           </a:p>
           <a:p>
             <a:pPr marL="548640" lvl="2" indent="0">
+              <a:lnSpc>
+                <a:spcPct val="95000"/>
+              </a:lnSpc>
+              <a:spcBef>
+                <a:spcPts val="1400"/>
+              </a:spcBef>
+              <a:spcAft>
+                <a:spcPts val="200"/>
+              </a:spcAft>
+              <a:buSzPct val="80000"/>
+              <a:buFont typeface="Arial" pitchFamily="34" charset="0"/>
               <a:buNone/>
             </a:pPr>
-            <a:endParaRPr lang="it-IT" sz="2000" dirty="0"/>
-          </a:p>
-          <a:p>
-            <a:pPr lvl="2"/>
-            <a:r>
-              <a:rPr lang="it-IT" sz="2000" dirty="0" smtClean="0"/>
+            <a:endParaRPr lang="it-IT" sz="2400" b="1" spc="10" dirty="0">
+              <a:solidFill>
+                <a:schemeClr val="tx1"/>
+              </a:solidFill>
+              <a:latin typeface="+mj-lt"/>
+            </a:endParaRPr>
+          </a:p>
+          <a:p>
+            <a:pPr lvl="2">
+              <a:lnSpc>
+                <a:spcPct val="95000"/>
+              </a:lnSpc>
+              <a:spcBef>
+                <a:spcPts val="1400"/>
+              </a:spcBef>
+              <a:spcAft>
+                <a:spcPts val="200"/>
+              </a:spcAft>
+              <a:buSzPct val="80000"/>
+            </a:pPr>
+            <a:r>
+              <a:rPr lang="it-IT" sz="2000" spc="10" dirty="0">
+                <a:solidFill>
+                  <a:schemeClr val="tx1"/>
+                </a:solidFill>
+                <a:latin typeface="+mj-lt"/>
+              </a:rPr>
               <a:t>Taxi Drivers </a:t>
             </a:r>
             <a:r>
-              <a:rPr lang="it-IT" sz="2000" dirty="0" err="1" smtClean="0"/>
+              <a:rPr lang="it-IT" sz="2000" spc="10" dirty="0" err="1">
+                <a:solidFill>
+                  <a:schemeClr val="tx1"/>
+                </a:solidFill>
+                <a:latin typeface="+mj-lt"/>
+              </a:rPr>
               <a:t>will</a:t>
             </a:r>
             <a:r>
-              <a:rPr lang="it-IT" sz="2000" dirty="0" smtClean="0"/>
+              <a:rPr lang="it-IT" sz="2000" spc="10" dirty="0">
+                <a:solidFill>
+                  <a:schemeClr val="tx1"/>
+                </a:solidFill>
+                <a:latin typeface="+mj-lt"/>
+              </a:rPr>
               <a:t> </a:t>
             </a:r>
             <a:r>
-              <a:rPr lang="it-IT" sz="2000" dirty="0" err="1" smtClean="0"/>
-              <a:t>acces</a:t>
-            </a:r>
-            <a:r>
-              <a:rPr lang="it-IT" sz="2000" dirty="0" err="1" smtClean="0"/>
-              <a:t>s</a:t>
-            </a:r>
-            <a:r>
-              <a:rPr lang="it-IT" sz="2000" dirty="0" smtClean="0"/>
+              <a:rPr lang="it-IT" sz="2000" spc="10" dirty="0" err="1">
+                <a:solidFill>
+                  <a:schemeClr val="tx1"/>
+                </a:solidFill>
+                <a:latin typeface="+mj-lt"/>
+              </a:rPr>
+              <a:t>access</a:t>
+            </a:r>
+            <a:r>
+              <a:rPr lang="it-IT" sz="2000" spc="10" dirty="0">
+                <a:solidFill>
+                  <a:schemeClr val="tx1"/>
+                </a:solidFill>
+                <a:latin typeface="+mj-lt"/>
+              </a:rPr>
               <a:t> the service </a:t>
             </a:r>
             <a:r>
-              <a:rPr lang="it-IT" sz="2000" dirty="0" err="1" smtClean="0"/>
+              <a:rPr lang="it-IT" sz="2000" spc="10" dirty="0" err="1">
+                <a:solidFill>
+                  <a:schemeClr val="tx1"/>
+                </a:solidFill>
+                <a:latin typeface="+mj-lt"/>
+              </a:rPr>
               <a:t>through</a:t>
             </a:r>
             <a:r>
-              <a:rPr lang="it-IT" sz="2000" dirty="0" smtClean="0"/>
+              <a:rPr lang="it-IT" sz="2000" spc="10" dirty="0">
+                <a:solidFill>
+                  <a:schemeClr val="tx1"/>
+                </a:solidFill>
+                <a:latin typeface="+mj-lt"/>
+              </a:rPr>
               <a:t> a mobile </a:t>
             </a:r>
             <a:r>
-              <a:rPr lang="it-IT" sz="2000" dirty="0" err="1" smtClean="0"/>
+              <a:rPr lang="it-IT" sz="2000" spc="10" dirty="0" err="1">
+                <a:solidFill>
+                  <a:schemeClr val="tx1"/>
+                </a:solidFill>
+                <a:latin typeface="+mj-lt"/>
+              </a:rPr>
               <a:t>device</a:t>
             </a:r>
-            <a:endParaRPr lang="it-IT" sz="2000" dirty="0" smtClean="0"/>
-          </a:p>
-          <a:p>
-            <a:pPr lvl="2"/>
-            <a:endParaRPr lang="it-IT" sz="2000" dirty="0"/>
-          </a:p>
-          <a:p>
-            <a:pPr lvl="2"/>
-            <a:r>
-              <a:rPr lang="it-IT" sz="2000" dirty="0" smtClean="0"/>
+            <a:endParaRPr lang="it-IT" sz="2000" spc="10" dirty="0">
+              <a:solidFill>
+                <a:schemeClr val="tx1"/>
+              </a:solidFill>
+              <a:latin typeface="+mj-lt"/>
+            </a:endParaRPr>
+          </a:p>
+          <a:p>
+            <a:pPr lvl="2">
+              <a:lnSpc>
+                <a:spcPct val="95000"/>
+              </a:lnSpc>
+              <a:spcBef>
+                <a:spcPts val="1400"/>
+              </a:spcBef>
+              <a:spcAft>
+                <a:spcPts val="200"/>
+              </a:spcAft>
+              <a:buSzPct val="80000"/>
+            </a:pPr>
+            <a:endParaRPr lang="it-IT" sz="2000" spc="10" dirty="0">
+              <a:solidFill>
+                <a:schemeClr val="tx1"/>
+              </a:solidFill>
+              <a:latin typeface="+mj-lt"/>
+            </a:endParaRPr>
+          </a:p>
+          <a:p>
+            <a:pPr lvl="2">
+              <a:lnSpc>
+                <a:spcPct val="95000"/>
+              </a:lnSpc>
+              <a:spcBef>
+                <a:spcPts val="1400"/>
+              </a:spcBef>
+              <a:spcAft>
+                <a:spcPts val="200"/>
+              </a:spcAft>
+              <a:buSzPct val="80000"/>
+            </a:pPr>
+            <a:r>
+              <a:rPr lang="it-IT" sz="2000" spc="10" dirty="0">
+                <a:solidFill>
+                  <a:schemeClr val="tx1"/>
+                </a:solidFill>
+                <a:latin typeface="+mj-lt"/>
+              </a:rPr>
               <a:t>Taxi Drivers </a:t>
             </a:r>
             <a:r>
-              <a:rPr lang="it-IT" sz="2000" dirty="0" err="1" smtClean="0"/>
+              <a:rPr lang="it-IT" sz="2000" spc="10" dirty="0" err="1">
+                <a:solidFill>
+                  <a:schemeClr val="tx1"/>
+                </a:solidFill>
+                <a:latin typeface="+mj-lt"/>
+              </a:rPr>
               <a:t>will</a:t>
             </a:r>
             <a:r>
-              <a:rPr lang="it-IT" sz="2000" dirty="0" smtClean="0"/>
+              <a:rPr lang="it-IT" sz="2000" spc="10" dirty="0">
+                <a:solidFill>
+                  <a:schemeClr val="tx1"/>
+                </a:solidFill>
+                <a:latin typeface="+mj-lt"/>
+              </a:rPr>
               <a:t> </a:t>
             </a:r>
             <a:r>
-              <a:rPr lang="it-IT" sz="2000" dirty="0" err="1" smtClean="0"/>
+              <a:rPr lang="it-IT" sz="2000" spc="10" dirty="0" err="1">
+                <a:solidFill>
+                  <a:schemeClr val="tx1"/>
+                </a:solidFill>
+                <a:latin typeface="+mj-lt"/>
+              </a:rPr>
               <a:t>get</a:t>
             </a:r>
             <a:r>
-              <a:rPr lang="it-IT" sz="2000" dirty="0" smtClean="0"/>
+              <a:rPr lang="it-IT" sz="2000" spc="10" dirty="0">
+                <a:solidFill>
+                  <a:schemeClr val="tx1"/>
+                </a:solidFill>
+                <a:latin typeface="+mj-lt"/>
+              </a:rPr>
               <a:t> </a:t>
             </a:r>
             <a:r>
-              <a:rPr lang="it-IT" sz="2000" dirty="0" err="1" smtClean="0"/>
+              <a:rPr lang="it-IT" sz="2000" spc="10" dirty="0" err="1">
+                <a:solidFill>
+                  <a:schemeClr val="tx1"/>
+                </a:solidFill>
+                <a:latin typeface="+mj-lt"/>
+              </a:rPr>
               <a:t>into</a:t>
             </a:r>
             <a:r>
-              <a:rPr lang="it-IT" sz="2000" dirty="0" smtClean="0"/>
+              <a:rPr lang="it-IT" sz="2000" spc="10" dirty="0">
+                <a:solidFill>
+                  <a:schemeClr val="tx1"/>
+                </a:solidFill>
+                <a:latin typeface="+mj-lt"/>
+              </a:rPr>
+              <a:t> FIFO </a:t>
+            </a:r>
+            <a:r>
+              <a:rPr lang="en-GB" sz="2000" spc="10" dirty="0">
+                <a:solidFill>
+                  <a:schemeClr val="tx1"/>
+                </a:solidFill>
+                <a:latin typeface="+mj-lt"/>
+              </a:rPr>
+              <a:t>queues</a:t>
+            </a:r>
+            <a:r>
+              <a:rPr lang="it-IT" sz="2000" spc="10" dirty="0">
+                <a:solidFill>
+                  <a:schemeClr val="tx1"/>
+                </a:solidFill>
+                <a:latin typeface="+mj-lt"/>
+              </a:rPr>
               <a:t> </a:t>
             </a:r>
             <a:r>
-              <a:rPr lang="it-IT" sz="2000" dirty="0" smtClean="0"/>
-              <a:t>FIFO </a:t>
-            </a:r>
-            <a:r>
-              <a:rPr lang="en-GB" sz="2000" dirty="0" smtClean="0"/>
-              <a:t>queues</a:t>
-            </a:r>
-            <a:r>
-              <a:rPr lang="it-IT" sz="2000" dirty="0" smtClean="0"/>
+              <a:rPr lang="it-IT" sz="2000" spc="10" dirty="0" err="1">
+                <a:solidFill>
+                  <a:schemeClr val="tx1"/>
+                </a:solidFill>
+                <a:latin typeface="+mj-lt"/>
+              </a:rPr>
+              <a:t>ordered</a:t>
+            </a:r>
+            <a:r>
+              <a:rPr lang="it-IT" sz="2000" spc="10" dirty="0">
+                <a:solidFill>
+                  <a:schemeClr val="tx1"/>
+                </a:solidFill>
+                <a:latin typeface="+mj-lt"/>
+              </a:rPr>
+              <a:t> on </a:t>
+            </a:r>
+            <a:r>
+              <a:rPr lang="it-IT" sz="2000" spc="10" dirty="0" err="1">
+                <a:solidFill>
+                  <a:schemeClr val="tx1"/>
+                </a:solidFill>
+                <a:latin typeface="+mj-lt"/>
+              </a:rPr>
+              <a:t>entrance</a:t>
+            </a:r>
+            <a:r>
+              <a:rPr lang="it-IT" sz="2000" spc="10" dirty="0">
+                <a:solidFill>
+                  <a:schemeClr val="tx1"/>
+                </a:solidFill>
+                <a:latin typeface="+mj-lt"/>
+              </a:rPr>
               <a:t> </a:t>
             </a:r>
             <a:r>
-              <a:rPr lang="it-IT" sz="2000" dirty="0" err="1" smtClean="0"/>
-              <a:t>ordered</a:t>
-            </a:r>
-            <a:r>
-              <a:rPr lang="it-IT" sz="2000" dirty="0" smtClean="0"/>
-              <a:t> on </a:t>
-            </a:r>
-            <a:r>
-              <a:rPr lang="it-IT" sz="2000" dirty="0" err="1" smtClean="0"/>
-              <a:t>entrance</a:t>
-            </a:r>
-            <a:r>
-              <a:rPr lang="it-IT" sz="2000" dirty="0" smtClean="0"/>
-              <a:t> </a:t>
-            </a:r>
-            <a:r>
-              <a:rPr lang="it-IT" sz="2000" dirty="0" err="1" smtClean="0"/>
+              <a:rPr lang="it-IT" sz="2000" spc="10" dirty="0" err="1">
+                <a:solidFill>
+                  <a:schemeClr val="tx1"/>
+                </a:solidFill>
+                <a:latin typeface="+mj-lt"/>
+              </a:rPr>
               <a:t>Timestamp</a:t>
             </a:r>
-            <a:endParaRPr lang="it-IT" sz="2000" dirty="0" smtClean="0"/>
+            <a:endParaRPr lang="it-IT" sz="2000" spc="10" dirty="0">
+              <a:solidFill>
+                <a:schemeClr val="tx1"/>
+              </a:solidFill>
+              <a:latin typeface="+mj-lt"/>
+            </a:endParaRPr>
           </a:p>
           <a:p>
             <a:pPr lvl="2"/>
@@ -6212,11 +6564,7 @@
           <a:p>
             <a:r>
               <a:rPr lang="it-IT" dirty="0" smtClean="0"/>
-              <a:t>Actors </a:t>
-            </a:r>
-            <a:r>
-              <a:rPr lang="it-IT" dirty="0" err="1" smtClean="0"/>
-              <a:t>Involved</a:t>
+              <a:t>Actors</a:t>
             </a:r>
             <a:endParaRPr lang="it-IT" dirty="0"/>
           </a:p>
@@ -6294,6 +6642,36 @@
           <a:xfrm>
             <a:off x="11426735" y="155275"/>
             <a:ext cx="632993" cy="677562"/>
+          </a:xfrm>
+          <a:prstGeom prst="rect">
+            <a:avLst/>
+          </a:prstGeom>
+        </p:spPr>
+      </p:pic>
+      <p:pic>
+        <p:nvPicPr>
+          <p:cNvPr id="5" name="Immagine 4"/>
+          <p:cNvPicPr>
+            <a:picLocks noChangeAspect="1"/>
+          </p:cNvPicPr>
+          <p:nvPr/>
+        </p:nvPicPr>
+        <p:blipFill>
+          <a:blip r:embed="rId3">
+            <a:extLst>
+              <a:ext uri="{28A0092B-C50C-407E-A947-70E740481C1C}">
+                <a14:useLocalDpi xmlns:a14="http://schemas.microsoft.com/office/drawing/2010/main" val="0"/>
+              </a:ext>
+            </a:extLst>
+          </a:blip>
+          <a:stretch>
+            <a:fillRect/>
+          </a:stretch>
+        </p:blipFill>
+        <p:spPr>
+          <a:xfrm>
+            <a:off x="5269464" y="2191108"/>
+            <a:ext cx="1251711" cy="2495078"/>
           </a:xfrm>
           <a:prstGeom prst="rect">
             <a:avLst/>
@@ -6435,6 +6813,13 @@
   <p:clrMapOvr>
     <a:masterClrMapping/>
   </p:clrMapOvr>
+  <p:timing>
+    <p:tnLst>
+      <p:par>
+        <p:cTn id="1" dur="indefinite" restart="never" nodeType="tmRoot"/>
+      </p:par>
+    </p:tnLst>
+  </p:timing>
 </p:sld>
 </file>
 
@@ -6553,6 +6938,13 @@
   <p:clrMapOvr>
     <a:masterClrMapping/>
   </p:clrMapOvr>
+  <p:timing>
+    <p:tnLst>
+      <p:par>
+        <p:cTn id="1" dur="indefinite" restart="never" nodeType="tmRoot"/>
+      </p:par>
+    </p:tnLst>
+  </p:timing>
 </p:sld>
 </file>
 
@@ -6671,6 +7063,13 @@
   <p:clrMapOvr>
     <a:masterClrMapping/>
   </p:clrMapOvr>
+  <p:timing>
+    <p:tnLst>
+      <p:par>
+        <p:cTn id="1" dur="indefinite" restart="never" nodeType="tmRoot"/>
+      </p:par>
+    </p:tnLst>
+  </p:timing>
 </p:sld>
 </file>
 
@@ -6811,6 +7210,13 @@
   <p:clrMapOvr>
     <a:masterClrMapping/>
   </p:clrMapOvr>
+  <p:timing>
+    <p:tnLst>
+      <p:par>
+        <p:cTn id="1" dur="indefinite" restart="never" nodeType="tmRoot"/>
+      </p:par>
+    </p:tnLst>
+  </p:timing>
 </p:sld>
 </file>
 

</xml_diff>